<commit_message>
revue 2023 jusque 040 inclus
</commit_message>
<xml_diff>
--- a/media/LDP-archival-fonds/010ex1-correction.pptx
+++ b/media/LDP-archival-fonds/010ex1-correction.pptx
@@ -262,7 +262,7 @@
           <a:p>
             <a:fld id="{5D3C7075-ACE4-4AC5-A698-3E16F22F5AEA}" type="datetimeFigureOut">
               <a:rPr lang="fr-CH" smtClean="0"/>
-              <a:t>23.03.2022</a:t>
+              <a:t>08.02.2023</a:t>
             </a:fld>
             <a:endParaRPr lang="fr-CH"/>
           </a:p>
@@ -462,7 +462,7 @@
           <a:p>
             <a:fld id="{5D3C7075-ACE4-4AC5-A698-3E16F22F5AEA}" type="datetimeFigureOut">
               <a:rPr lang="fr-CH" smtClean="0"/>
-              <a:t>23.03.2022</a:t>
+              <a:t>08.02.2023</a:t>
             </a:fld>
             <a:endParaRPr lang="fr-CH"/>
           </a:p>
@@ -672,7 +672,7 @@
           <a:p>
             <a:fld id="{5D3C7075-ACE4-4AC5-A698-3E16F22F5AEA}" type="datetimeFigureOut">
               <a:rPr lang="fr-CH" smtClean="0"/>
-              <a:t>23.03.2022</a:t>
+              <a:t>08.02.2023</a:t>
             </a:fld>
             <a:endParaRPr lang="fr-CH"/>
           </a:p>
@@ -872,7 +872,7 @@
           <a:p>
             <a:fld id="{5D3C7075-ACE4-4AC5-A698-3E16F22F5AEA}" type="datetimeFigureOut">
               <a:rPr lang="fr-CH" smtClean="0"/>
-              <a:t>23.03.2022</a:t>
+              <a:t>08.02.2023</a:t>
             </a:fld>
             <a:endParaRPr lang="fr-CH"/>
           </a:p>
@@ -1148,7 +1148,7 @@
           <a:p>
             <a:fld id="{5D3C7075-ACE4-4AC5-A698-3E16F22F5AEA}" type="datetimeFigureOut">
               <a:rPr lang="fr-CH" smtClean="0"/>
-              <a:t>23.03.2022</a:t>
+              <a:t>08.02.2023</a:t>
             </a:fld>
             <a:endParaRPr lang="fr-CH"/>
           </a:p>
@@ -1416,7 +1416,7 @@
           <a:p>
             <a:fld id="{5D3C7075-ACE4-4AC5-A698-3E16F22F5AEA}" type="datetimeFigureOut">
               <a:rPr lang="fr-CH" smtClean="0"/>
-              <a:t>23.03.2022</a:t>
+              <a:t>08.02.2023</a:t>
             </a:fld>
             <a:endParaRPr lang="fr-CH"/>
           </a:p>
@@ -1831,7 +1831,7 @@
           <a:p>
             <a:fld id="{5D3C7075-ACE4-4AC5-A698-3E16F22F5AEA}" type="datetimeFigureOut">
               <a:rPr lang="fr-CH" smtClean="0"/>
-              <a:t>23.03.2022</a:t>
+              <a:t>08.02.2023</a:t>
             </a:fld>
             <a:endParaRPr lang="fr-CH"/>
           </a:p>
@@ -1973,7 +1973,7 @@
           <a:p>
             <a:fld id="{5D3C7075-ACE4-4AC5-A698-3E16F22F5AEA}" type="datetimeFigureOut">
               <a:rPr lang="fr-CH" smtClean="0"/>
-              <a:t>23.03.2022</a:t>
+              <a:t>08.02.2023</a:t>
             </a:fld>
             <a:endParaRPr lang="fr-CH"/>
           </a:p>
@@ -2086,7 +2086,7 @@
           <a:p>
             <a:fld id="{5D3C7075-ACE4-4AC5-A698-3E16F22F5AEA}" type="datetimeFigureOut">
               <a:rPr lang="fr-CH" smtClean="0"/>
-              <a:t>23.03.2022</a:t>
+              <a:t>08.02.2023</a:t>
             </a:fld>
             <a:endParaRPr lang="fr-CH"/>
           </a:p>
@@ -2399,7 +2399,7 @@
           <a:p>
             <a:fld id="{5D3C7075-ACE4-4AC5-A698-3E16F22F5AEA}" type="datetimeFigureOut">
               <a:rPr lang="fr-CH" smtClean="0"/>
-              <a:t>23.03.2022</a:t>
+              <a:t>08.02.2023</a:t>
             </a:fld>
             <a:endParaRPr lang="fr-CH"/>
           </a:p>
@@ -2688,7 +2688,7 @@
           <a:p>
             <a:fld id="{5D3C7075-ACE4-4AC5-A698-3E16F22F5AEA}" type="datetimeFigureOut">
               <a:rPr lang="fr-CH" smtClean="0"/>
-              <a:t>23.03.2022</a:t>
+              <a:t>08.02.2023</a:t>
             </a:fld>
             <a:endParaRPr lang="fr-CH"/>
           </a:p>
@@ -2931,7 +2931,7 @@
           <a:p>
             <a:fld id="{5D3C7075-ACE4-4AC5-A698-3E16F22F5AEA}" type="datetimeFigureOut">
               <a:rPr lang="fr-CH" smtClean="0"/>
-              <a:t>23.03.2022</a:t>
+              <a:t>08.02.2023</a:t>
             </a:fld>
             <a:endParaRPr lang="fr-CH"/>
           </a:p>
@@ -3500,7 +3500,7 @@
         <p:spPr>
           <a:xfrm>
             <a:off x="4856414" y="134820"/>
-            <a:ext cx="7215343" cy="3139321"/>
+            <a:ext cx="7215343" cy="3693319"/>
           </a:xfrm>
           <a:prstGeom prst="rect">
             <a:avLst/>
@@ -3591,6 +3591,25 @@
               <a:rPr lang="fr-CH"/>
               <a:t> </a:t>
             </a:r>
+          </a:p>
+          <a:p>
+            <a:r>
+              <a:rPr lang="fr-CH"/>
+              <a:t>type: </a:t>
+            </a:r>
+            <a:r>
+              <a:rPr lang="fr-CH">
+                <a:hlinkClick r:id="rId6"/>
+              </a:rPr>
+              <a:t>https://architrave-hesge.ch/type/</a:t>
+            </a:r>
+            <a:r>
+              <a:rPr lang="fr-CH"/>
+              <a:t> </a:t>
+            </a:r>
+          </a:p>
+          <a:p>
+            <a:endParaRPr lang="fr-CH"/>
           </a:p>
           <a:p>
             <a:endParaRPr lang="fr-CH"/>
@@ -3686,7 +3705,7 @@
                   <a:schemeClr val="tx1"/>
                 </a:solidFill>
               </a:rPr>
-              <a:t>	      rico:subfonds ] ;</a:t>
+              <a:t>	      type:SubFonds ] ;</a:t>
             </a:r>
           </a:p>
           <a:p>
@@ -3782,7 +3801,7 @@
                   <a:schemeClr val="tx1"/>
                 </a:solidFill>
               </a:rPr>
-              <a:t>	     rico:serie ] ;</a:t>
+              <a:t>	     type:Serie ] ;</a:t>
             </a:r>
           </a:p>
           <a:p>
@@ -3973,7 +3992,7 @@
                   <a:schemeClr val="tx1"/>
                 </a:solidFill>
               </a:rPr>
-              <a:t>	      rico:piece.</a:t>
+              <a:t>	      type:Piece.</a:t>
             </a:r>
           </a:p>
           <a:p>
@@ -4230,7 +4249,7 @@
                   <a:schemeClr val="tx1"/>
                 </a:solidFill>
               </a:rPr>
-              <a:t>	        rico:fonds ] ;</a:t>
+              <a:t>	        type:Fonds ] ;</a:t>
             </a:r>
           </a:p>
           <a:p>
@@ -4349,7 +4368,7 @@
           <p:nvPr/>
         </p:nvPicPr>
         <p:blipFill>
-          <a:blip r:embed="rId6">
+          <a:blip r:embed="rId7">
             <a:extLst>
               <a:ext uri="{28A0092B-C50C-407E-A947-70E740481C1C}">
                 <a14:useLocalDpi xmlns:a14="http://schemas.microsoft.com/office/drawing/2010/main" val="0"/>

</xml_diff>

<commit_message>
updated 000, 010. 020
</commit_message>
<xml_diff>
--- a/media/LDP-archival-fonds/010ex1-correction.pptx
+++ b/media/LDP-archival-fonds/010ex1-correction.pptx
@@ -262,7 +262,7 @@
           <a:p>
             <a:fld id="{5D3C7075-ACE4-4AC5-A698-3E16F22F5AEA}" type="datetimeFigureOut">
               <a:rPr lang="fr-CH" smtClean="0"/>
-              <a:t>08.02.2023</a:t>
+              <a:t>18.04.2023</a:t>
             </a:fld>
             <a:endParaRPr lang="fr-CH"/>
           </a:p>
@@ -462,7 +462,7 @@
           <a:p>
             <a:fld id="{5D3C7075-ACE4-4AC5-A698-3E16F22F5AEA}" type="datetimeFigureOut">
               <a:rPr lang="fr-CH" smtClean="0"/>
-              <a:t>08.02.2023</a:t>
+              <a:t>18.04.2023</a:t>
             </a:fld>
             <a:endParaRPr lang="fr-CH"/>
           </a:p>
@@ -672,7 +672,7 @@
           <a:p>
             <a:fld id="{5D3C7075-ACE4-4AC5-A698-3E16F22F5AEA}" type="datetimeFigureOut">
               <a:rPr lang="fr-CH" smtClean="0"/>
-              <a:t>08.02.2023</a:t>
+              <a:t>18.04.2023</a:t>
             </a:fld>
             <a:endParaRPr lang="fr-CH"/>
           </a:p>
@@ -872,7 +872,7 @@
           <a:p>
             <a:fld id="{5D3C7075-ACE4-4AC5-A698-3E16F22F5AEA}" type="datetimeFigureOut">
               <a:rPr lang="fr-CH" smtClean="0"/>
-              <a:t>08.02.2023</a:t>
+              <a:t>18.04.2023</a:t>
             </a:fld>
             <a:endParaRPr lang="fr-CH"/>
           </a:p>
@@ -1148,7 +1148,7 @@
           <a:p>
             <a:fld id="{5D3C7075-ACE4-4AC5-A698-3E16F22F5AEA}" type="datetimeFigureOut">
               <a:rPr lang="fr-CH" smtClean="0"/>
-              <a:t>08.02.2023</a:t>
+              <a:t>18.04.2023</a:t>
             </a:fld>
             <a:endParaRPr lang="fr-CH"/>
           </a:p>
@@ -1416,7 +1416,7 @@
           <a:p>
             <a:fld id="{5D3C7075-ACE4-4AC5-A698-3E16F22F5AEA}" type="datetimeFigureOut">
               <a:rPr lang="fr-CH" smtClean="0"/>
-              <a:t>08.02.2023</a:t>
+              <a:t>18.04.2023</a:t>
             </a:fld>
             <a:endParaRPr lang="fr-CH"/>
           </a:p>
@@ -1831,7 +1831,7 @@
           <a:p>
             <a:fld id="{5D3C7075-ACE4-4AC5-A698-3E16F22F5AEA}" type="datetimeFigureOut">
               <a:rPr lang="fr-CH" smtClean="0"/>
-              <a:t>08.02.2023</a:t>
+              <a:t>18.04.2023</a:t>
             </a:fld>
             <a:endParaRPr lang="fr-CH"/>
           </a:p>
@@ -1973,7 +1973,7 @@
           <a:p>
             <a:fld id="{5D3C7075-ACE4-4AC5-A698-3E16F22F5AEA}" type="datetimeFigureOut">
               <a:rPr lang="fr-CH" smtClean="0"/>
-              <a:t>08.02.2023</a:t>
+              <a:t>18.04.2023</a:t>
             </a:fld>
             <a:endParaRPr lang="fr-CH"/>
           </a:p>
@@ -2086,7 +2086,7 @@
           <a:p>
             <a:fld id="{5D3C7075-ACE4-4AC5-A698-3E16F22F5AEA}" type="datetimeFigureOut">
               <a:rPr lang="fr-CH" smtClean="0"/>
-              <a:t>08.02.2023</a:t>
+              <a:t>18.04.2023</a:t>
             </a:fld>
             <a:endParaRPr lang="fr-CH"/>
           </a:p>
@@ -2399,7 +2399,7 @@
           <a:p>
             <a:fld id="{5D3C7075-ACE4-4AC5-A698-3E16F22F5AEA}" type="datetimeFigureOut">
               <a:rPr lang="fr-CH" smtClean="0"/>
-              <a:t>08.02.2023</a:t>
+              <a:t>18.04.2023</a:t>
             </a:fld>
             <a:endParaRPr lang="fr-CH"/>
           </a:p>
@@ -2688,7 +2688,7 @@
           <a:p>
             <a:fld id="{5D3C7075-ACE4-4AC5-A698-3E16F22F5AEA}" type="datetimeFigureOut">
               <a:rPr lang="fr-CH" smtClean="0"/>
-              <a:t>08.02.2023</a:t>
+              <a:t>18.04.2023</a:t>
             </a:fld>
             <a:endParaRPr lang="fr-CH"/>
           </a:p>
@@ -2931,7 +2931,7 @@
           <a:p>
             <a:fld id="{5D3C7075-ACE4-4AC5-A698-3E16F22F5AEA}" type="datetimeFigureOut">
               <a:rPr lang="fr-CH" smtClean="0"/>
-              <a:t>08.02.2023</a:t>
+              <a:t>18.04.2023</a:t>
             </a:fld>
             <a:endParaRPr lang="fr-CH"/>
           </a:p>
@@ -3500,7 +3500,7 @@
         <p:spPr>
           <a:xfrm>
             <a:off x="4856414" y="134820"/>
-            <a:ext cx="7215343" cy="3693319"/>
+            <a:ext cx="7215343" cy="3108543"/>
           </a:xfrm>
           <a:prstGeom prst="rect">
             <a:avLst/>
@@ -3519,117 +3519,139 @@
           <a:lstStyle/>
           <a:p>
             <a:r>
-              <a:rPr lang="fr-CH" b="1" i="1"/>
+              <a:rPr lang="fr-CH" b="1" i="1" dirty="0"/>
               <a:t>Exemple</a:t>
             </a:r>
           </a:p>
           <a:p>
             <a:r>
-              <a:rPr lang="fr-CH" b="1" i="1">
+              <a:rPr lang="fr-CH" b="1" i="1" dirty="0">
                 <a:hlinkClick r:id="rId2"/>
               </a:rPr>
               <a:t>https://architrave-hesge.ch/parking-du-mont-blanc-et-rade-diapositive-3</a:t>
             </a:r>
             <a:r>
-              <a:rPr lang="fr-CH" b="1" i="1"/>
+              <a:rPr lang="fr-CH" b="1" i="1" dirty="0"/>
               <a:t>  </a:t>
             </a:r>
           </a:p>
           <a:p>
-            <a:endParaRPr lang="fr-CH" b="1" i="1"/>
-          </a:p>
-          <a:p>
-            <a:r>
-              <a:rPr lang="fr-CH" b="1" i="1"/>
-              <a:t>Namespaces/Prefixes</a:t>
-            </a:r>
-          </a:p>
-          <a:p>
-            <a:r>
-              <a:rPr lang="fr-CH"/>
-              <a:t>ldp:   </a:t>
-            </a:r>
-            <a:r>
-              <a:rPr lang="fr-CH">
+            <a:endParaRPr lang="fr-CH" sz="800" b="1" i="1" dirty="0"/>
+          </a:p>
+          <a:p>
+            <a:r>
+              <a:rPr lang="fr-CH" b="1" i="1" dirty="0" err="1"/>
+              <a:t>Namespaces</a:t>
+            </a:r>
+            <a:r>
+              <a:rPr lang="fr-CH" b="1" i="1" dirty="0"/>
+              <a:t>/</a:t>
+            </a:r>
+            <a:r>
+              <a:rPr lang="fr-CH" b="1" i="1" dirty="0" err="1"/>
+              <a:t>Prefixes</a:t>
+            </a:r>
+            <a:endParaRPr lang="fr-CH" b="1" i="1" dirty="0"/>
+          </a:p>
+          <a:p>
+            <a:r>
+              <a:rPr lang="fr-CH" dirty="0" err="1"/>
+              <a:t>ldp</a:t>
+            </a:r>
+            <a:r>
+              <a:rPr lang="fr-CH" dirty="0"/>
+              <a:t>:   </a:t>
+            </a:r>
+            <a:r>
+              <a:rPr lang="fr-CH" dirty="0">
                 <a:hlinkClick r:id="rId3"/>
               </a:rPr>
               <a:t>https://www.w3.org/ns/ldp/#</a:t>
             </a:r>
             <a:r>
-              <a:rPr lang="fr-CH"/>
+              <a:rPr lang="fr-CH" dirty="0"/>
               <a:t>   </a:t>
             </a:r>
           </a:p>
           <a:p>
             <a:r>
-              <a:rPr lang="fr-CH"/>
-              <a:t>rico:  </a:t>
-            </a:r>
-            <a:r>
-              <a:rPr lang="fr-CH">
+              <a:rPr lang="fr-CH" dirty="0" err="1"/>
+              <a:t>rico</a:t>
+            </a:r>
+            <a:r>
+              <a:rPr lang="fr-CH" dirty="0"/>
+              <a:t>:  </a:t>
+            </a:r>
+            <a:r>
+              <a:rPr lang="fr-CH" dirty="0">
                 <a:hlinkClick r:id="rId4"/>
               </a:rPr>
               <a:t>https://www.ica.org/standards/RiC/ontology.html#</a:t>
             </a:r>
             <a:r>
-              <a:rPr lang="fr-CH"/>
+              <a:rPr lang="fr-CH" dirty="0"/>
               <a:t> </a:t>
             </a:r>
           </a:p>
           <a:p>
             <a:r>
-              <a:rPr lang="fr-CH"/>
+              <a:rPr lang="fr-CH" dirty="0"/>
               <a:t>at:     </a:t>
             </a:r>
             <a:r>
-              <a:rPr lang="fr-CH">
+              <a:rPr lang="fr-CH" dirty="0">
                 <a:hlinkClick r:id="rId5"/>
               </a:rPr>
               <a:t>https://architrave-hesge.ch/</a:t>
             </a:r>
             <a:r>
-              <a:rPr lang="fr-CH"/>
+              <a:rPr lang="fr-CH" dirty="0"/>
               <a:t> </a:t>
             </a:r>
           </a:p>
           <a:p>
             <a:r>
-              <a:rPr lang="fr-CH"/>
+              <a:rPr lang="fr-CH" dirty="0"/>
               <a:t>type: </a:t>
             </a:r>
             <a:r>
-              <a:rPr lang="fr-CH">
+              <a:rPr lang="fr-CH" dirty="0">
                 <a:hlinkClick r:id="rId6"/>
               </a:rPr>
               <a:t>https://architrave-hesge.ch/type/</a:t>
             </a:r>
             <a:r>
-              <a:rPr lang="fr-CH"/>
+              <a:rPr lang="fr-CH" dirty="0"/>
               <a:t> </a:t>
             </a:r>
           </a:p>
           <a:p>
-            <a:endParaRPr lang="fr-CH"/>
-          </a:p>
-          <a:p>
-            <a:endParaRPr lang="fr-CH"/>
-          </a:p>
-          <a:p>
-            <a:r>
-              <a:rPr lang="fr-CH" b="1" i="1"/>
+            <a:endParaRPr lang="fr-CH" sz="800" dirty="0"/>
+          </a:p>
+          <a:p>
+            <a:r>
+              <a:rPr lang="fr-CH" b="1" i="1" dirty="0"/>
               <a:t>Remarque</a:t>
             </a:r>
           </a:p>
           <a:p>
             <a:r>
-              <a:rPr lang="fr-CH"/>
+              <a:rPr lang="fr-CH" dirty="0"/>
               <a:t>Cet exercice, créé à des fins pédagogiques, n’est pas </a:t>
             </a:r>
           </a:p>
           <a:p>
             <a:r>
-              <a:rPr lang="fr-CH"/>
-              <a:t>formellement valide (notamment concernant l’usage de RiC).</a:t>
+              <a:rPr lang="fr-CH" dirty="0"/>
+              <a:t>formellement valide (notamment concernant l’usage de </a:t>
+            </a:r>
+            <a:r>
+              <a:rPr lang="fr-CH" dirty="0" err="1"/>
+              <a:t>RiC</a:t>
+            </a:r>
+            <a:r>
+              <a:rPr lang="fr-CH" dirty="0"/>
+              <a:t>).</a:t>
             </a:r>
           </a:p>
         </p:txBody>
@@ -3680,52 +3702,153 @@
           <a:lstStyle/>
           <a:p>
             <a:r>
-              <a:rPr lang="fr-CH" sz="1400">
+              <a:rPr lang="fr-CH" sz="1400" dirty="0" err="1">
                 <a:solidFill>
                   <a:schemeClr val="tx1"/>
                 </a:solidFill>
               </a:rPr>
               <a:t>at:zscc-img</a:t>
             </a:r>
-          </a:p>
-          <a:p>
-            <a:r>
-              <a:rPr lang="fr-CH" sz="1400">
-                <a:solidFill>
-                  <a:schemeClr val="tx1"/>
-                </a:solidFill>
-              </a:rPr>
-              <a:t>           rdf:type [ ldp:Container;</a:t>
-            </a:r>
-          </a:p>
-          <a:p>
-            <a:r>
-              <a:rPr lang="fr-CH" sz="1400">
-                <a:solidFill>
-                  <a:schemeClr val="tx1"/>
-                </a:solidFill>
-              </a:rPr>
-              <a:t>	      type:SubFonds ] ;</a:t>
-            </a:r>
-          </a:p>
-          <a:p>
-            <a:r>
-              <a:rPr lang="fr-CH" sz="1400">
-                <a:solidFill>
-                  <a:schemeClr val="tx1"/>
-                </a:solidFill>
-              </a:rPr>
-              <a:t>            rico:harOrHadTitle ‘‘Images‘’;</a:t>
-            </a:r>
-          </a:p>
-          <a:p>
-            <a:r>
-              <a:rPr lang="fr-CH" sz="1400">
-                <a:solidFill>
-                  <a:schemeClr val="tx1"/>
-                </a:solidFill>
-              </a:rPr>
-              <a:t>            rico: hasBeginingDate ‘’1967‘’.</a:t>
+            <a:endParaRPr lang="fr-CH" sz="1400" dirty="0">
+              <a:solidFill>
+                <a:schemeClr val="tx1"/>
+              </a:solidFill>
+            </a:endParaRPr>
+          </a:p>
+          <a:p>
+            <a:r>
+              <a:rPr lang="fr-CH" sz="1400" dirty="0">
+                <a:solidFill>
+                  <a:schemeClr val="tx1"/>
+                </a:solidFill>
+              </a:rPr>
+              <a:t>           </a:t>
+            </a:r>
+            <a:r>
+              <a:rPr lang="fr-CH" sz="1400" dirty="0" err="1">
+                <a:solidFill>
+                  <a:schemeClr val="tx1"/>
+                </a:solidFill>
+              </a:rPr>
+              <a:t>rdf:type</a:t>
+            </a:r>
+            <a:r>
+              <a:rPr lang="fr-CH" sz="1400" dirty="0">
+                <a:solidFill>
+                  <a:schemeClr val="tx1"/>
+                </a:solidFill>
+              </a:rPr>
+              <a:t> [ </a:t>
+            </a:r>
+            <a:r>
+              <a:rPr lang="fr-CH" sz="1400" dirty="0" err="1">
+                <a:solidFill>
+                  <a:schemeClr val="tx1"/>
+                </a:solidFill>
+              </a:rPr>
+              <a:t>ldp:Container</a:t>
+            </a:r>
+            <a:r>
+              <a:rPr lang="fr-CH" sz="1400" dirty="0">
+                <a:solidFill>
+                  <a:schemeClr val="tx1"/>
+                </a:solidFill>
+              </a:rPr>
+              <a:t> ,</a:t>
+            </a:r>
+          </a:p>
+          <a:p>
+            <a:r>
+              <a:rPr lang="fr-CH" sz="1400" dirty="0">
+                <a:solidFill>
+                  <a:schemeClr val="tx1"/>
+                </a:solidFill>
+              </a:rPr>
+              <a:t>	      </a:t>
+            </a:r>
+            <a:r>
+              <a:rPr lang="fr-CH" sz="1400" dirty="0" err="1">
+                <a:solidFill>
+                  <a:schemeClr val="tx1"/>
+                </a:solidFill>
+              </a:rPr>
+              <a:t>type:SubFonds</a:t>
+            </a:r>
+            <a:r>
+              <a:rPr lang="fr-CH" sz="1400" dirty="0">
+                <a:solidFill>
+                  <a:schemeClr val="tx1"/>
+                </a:solidFill>
+              </a:rPr>
+              <a:t> ] ;</a:t>
+            </a:r>
+          </a:p>
+          <a:p>
+            <a:r>
+              <a:rPr lang="fr-CH" sz="1400" dirty="0">
+                <a:solidFill>
+                  <a:schemeClr val="tx1"/>
+                </a:solidFill>
+              </a:rPr>
+              <a:t>            </a:t>
+            </a:r>
+            <a:r>
+              <a:rPr lang="fr-CH" sz="1400" dirty="0" err="1">
+                <a:solidFill>
+                  <a:schemeClr val="tx1"/>
+                </a:solidFill>
+              </a:rPr>
+              <a:t>rico:harOrHadTitle</a:t>
+            </a:r>
+            <a:r>
+              <a:rPr lang="fr-CH" sz="1400" dirty="0">
+                <a:solidFill>
+                  <a:schemeClr val="tx1"/>
+                </a:solidFill>
+              </a:rPr>
+              <a:t> ‘‘Images‘’;</a:t>
+            </a:r>
+          </a:p>
+          <a:p>
+            <a:r>
+              <a:rPr lang="fr-CH" sz="1400" dirty="0">
+                <a:solidFill>
+                  <a:schemeClr val="tx1"/>
+                </a:solidFill>
+              </a:rPr>
+              <a:t>            </a:t>
+            </a:r>
+            <a:r>
+              <a:rPr lang="fr-CH" sz="1400" dirty="0" err="1">
+                <a:solidFill>
+                  <a:schemeClr val="tx1"/>
+                </a:solidFill>
+              </a:rPr>
+              <a:t>rico</a:t>
+            </a:r>
+            <a:r>
+              <a:rPr lang="fr-CH" sz="1400" dirty="0">
+                <a:solidFill>
+                  <a:schemeClr val="tx1"/>
+                </a:solidFill>
+              </a:rPr>
+              <a:t>: </a:t>
+            </a:r>
+            <a:r>
+              <a:rPr lang="fr-CH" sz="1400" dirty="0" err="1">
+                <a:solidFill>
+                  <a:schemeClr val="tx1"/>
+                </a:solidFill>
+              </a:rPr>
+              <a:t>hasBeginingDate</a:t>
+            </a:r>
+            <a:r>
+              <a:rPr lang="fr-CH" sz="1400" dirty="0">
+                <a:solidFill>
+                  <a:schemeClr val="tx1"/>
+                </a:solidFill>
+              </a:rPr>
+              <a:t> ‘’1967‘’.</a:t>
             </a:r>
           </a:p>
         </p:txBody>
@@ -3776,45 +3899,114 @@
           <a:lstStyle/>
           <a:p>
             <a:r>
-              <a:rPr lang="fr-CH" sz="1400">
+              <a:rPr lang="fr-CH" sz="1400" dirty="0" err="1">
                 <a:solidFill>
                   <a:schemeClr val="tx1"/>
                 </a:solidFill>
               </a:rPr>
               <a:t>at:parking-du-mont-blanc-et-rade</a:t>
             </a:r>
-          </a:p>
-          <a:p>
-            <a:r>
-              <a:rPr lang="fr-CH" sz="1400">
-                <a:solidFill>
-                  <a:schemeClr val="tx1"/>
-                </a:solidFill>
-              </a:rPr>
-              <a:t>          rdf:type [ ldp:Container;</a:t>
-            </a:r>
-          </a:p>
-          <a:p>
-            <a:r>
-              <a:rPr lang="fr-CH" sz="1400">
-                <a:solidFill>
-                  <a:schemeClr val="tx1"/>
-                </a:solidFill>
-              </a:rPr>
-              <a:t>	     type:Serie ] ;</a:t>
-            </a:r>
-          </a:p>
-          <a:p>
-            <a:r>
-              <a:rPr lang="fr-CH" sz="1400">
-                <a:solidFill>
-                  <a:schemeClr val="tx1"/>
-                </a:solidFill>
-              </a:rPr>
-              <a:t>          rico:harOrHadTitle ‘’</a:t>
-            </a:r>
-            <a:r>
-              <a:rPr lang="fr-FR" sz="1400">
+            <a:endParaRPr lang="fr-CH" sz="1400" dirty="0">
+              <a:solidFill>
+                <a:schemeClr val="tx1"/>
+              </a:solidFill>
+            </a:endParaRPr>
+          </a:p>
+          <a:p>
+            <a:r>
+              <a:rPr lang="fr-CH" sz="1400" dirty="0">
+                <a:solidFill>
+                  <a:schemeClr val="tx1"/>
+                </a:solidFill>
+              </a:rPr>
+              <a:t>          </a:t>
+            </a:r>
+            <a:r>
+              <a:rPr lang="fr-CH" sz="1400" dirty="0" err="1">
+                <a:solidFill>
+                  <a:schemeClr val="tx1"/>
+                </a:solidFill>
+              </a:rPr>
+              <a:t>rdf:type</a:t>
+            </a:r>
+            <a:r>
+              <a:rPr lang="fr-CH" sz="1400" dirty="0">
+                <a:solidFill>
+                  <a:schemeClr val="tx1"/>
+                </a:solidFill>
+              </a:rPr>
+              <a:t> [ </a:t>
+            </a:r>
+            <a:r>
+              <a:rPr lang="fr-CH" sz="1400" dirty="0" err="1">
+                <a:solidFill>
+                  <a:schemeClr val="tx1"/>
+                </a:solidFill>
+              </a:rPr>
+              <a:t>ldp:Container</a:t>
+            </a:r>
+            <a:r>
+              <a:rPr lang="fr-CH" sz="1400" dirty="0">
+                <a:solidFill>
+                  <a:schemeClr val="tx1"/>
+                </a:solidFill>
+              </a:rPr>
+              <a:t> ,</a:t>
+            </a:r>
+          </a:p>
+          <a:p>
+            <a:r>
+              <a:rPr lang="fr-CH" sz="1400" dirty="0">
+                <a:solidFill>
+                  <a:schemeClr val="tx1"/>
+                </a:solidFill>
+              </a:rPr>
+              <a:t>	     </a:t>
+            </a:r>
+            <a:r>
+              <a:rPr lang="fr-CH" sz="1400" dirty="0" err="1">
+                <a:solidFill>
+                  <a:schemeClr val="tx1"/>
+                </a:solidFill>
+              </a:rPr>
+              <a:t>type:Serie</a:t>
+            </a:r>
+            <a:r>
+              <a:rPr lang="fr-CH" sz="1400" dirty="0">
+                <a:solidFill>
+                  <a:schemeClr val="tx1"/>
+                </a:solidFill>
+              </a:rPr>
+              <a:t> ] ;</a:t>
+            </a:r>
+          </a:p>
+          <a:p>
+            <a:r>
+              <a:rPr lang="fr-CH" sz="1400" dirty="0">
+                <a:solidFill>
+                  <a:schemeClr val="tx1"/>
+                </a:solidFill>
+              </a:rPr>
+              <a:t>          </a:t>
+            </a:r>
+            <a:r>
+              <a:rPr lang="fr-CH" sz="1400" dirty="0" err="1">
+                <a:solidFill>
+                  <a:schemeClr val="tx1"/>
+                </a:solidFill>
+              </a:rPr>
+              <a:t>rico:harOrHadTitle</a:t>
+            </a:r>
+            <a:r>
+              <a:rPr lang="fr-CH" sz="1400" dirty="0">
+                <a:solidFill>
+                  <a:schemeClr val="tx1"/>
+                </a:solidFill>
+              </a:rPr>
+              <a:t> ‘’</a:t>
+            </a:r>
+            <a:r>
+              <a:rPr lang="fr-FR" sz="1400" dirty="0">
                 <a:solidFill>
                   <a:schemeClr val="tx1"/>
                 </a:solidFill>
@@ -3822,7 +4014,7 @@
               <a:t>Parking du Mont-Blanc et Rade</a:t>
             </a:r>
             <a:r>
-              <a:rPr lang="fr-CH" sz="1400">
+              <a:rPr lang="fr-CH" sz="1400" dirty="0">
                 <a:solidFill>
                   <a:schemeClr val="tx1"/>
                 </a:solidFill>
@@ -3832,12 +4024,44 @@
           </a:p>
           <a:p>
             <a:r>
-              <a:rPr lang="fr-CH" sz="1400">
-                <a:solidFill>
-                  <a:schemeClr val="tx1"/>
-                </a:solidFill>
-              </a:rPr>
-              <a:t>         rico: hasBeginingDate ‘’1967‘’.</a:t>
+              <a:rPr lang="fr-CH" sz="1400" dirty="0">
+                <a:solidFill>
+                  <a:schemeClr val="tx1"/>
+                </a:solidFill>
+              </a:rPr>
+              <a:t>         </a:t>
+            </a:r>
+            <a:r>
+              <a:rPr lang="fr-CH" sz="1400" dirty="0" err="1">
+                <a:solidFill>
+                  <a:schemeClr val="tx1"/>
+                </a:solidFill>
+              </a:rPr>
+              <a:t>rico</a:t>
+            </a:r>
+            <a:r>
+              <a:rPr lang="fr-CH" sz="1400" dirty="0">
+                <a:solidFill>
+                  <a:schemeClr val="tx1"/>
+                </a:solidFill>
+              </a:rPr>
+              <a:t>: </a:t>
+            </a:r>
+            <a:r>
+              <a:rPr lang="fr-CH" sz="1400" dirty="0" err="1">
+                <a:solidFill>
+                  <a:schemeClr val="tx1"/>
+                </a:solidFill>
+              </a:rPr>
+              <a:t>hasBeginingDate</a:t>
+            </a:r>
+            <a:r>
+              <a:rPr lang="fr-CH" sz="1400" dirty="0">
+                <a:solidFill>
+                  <a:schemeClr val="tx1"/>
+                </a:solidFill>
+              </a:rPr>
+              <a:t> ‘’1967‘’.</a:t>
             </a:r>
           </a:p>
         </p:txBody>
@@ -3901,7 +4125,7 @@
         <p:spPr>
           <a:xfrm>
             <a:off x="2685900" y="3388376"/>
-            <a:ext cx="1077026" cy="307777"/>
+            <a:ext cx="4106038" cy="523220"/>
           </a:xfrm>
           <a:prstGeom prst="rect">
             <a:avLst/>
@@ -3915,9 +4139,29 @@
           <a:lstStyle/>
           <a:p>
             <a:r>
-              <a:rPr lang="fr-CH" sz="1400"/>
+              <a:rPr lang="fr-CH" sz="1400" dirty="0" err="1"/>
               <a:t>ldp:contains</a:t>
             </a:r>
+            <a:r>
+              <a:rPr lang="fr-CH" sz="1400" dirty="0"/>
+              <a:t> </a:t>
+            </a:r>
+            <a:r>
+              <a:rPr lang="fr-CH" sz="1400" dirty="0" err="1">
+                <a:solidFill>
+                  <a:schemeClr val="tx1"/>
+                </a:solidFill>
+              </a:rPr>
+              <a:t>at:parking-du-mont-blanc-et-rade</a:t>
+            </a:r>
+            <a:endParaRPr lang="fr-CH" sz="1400" dirty="0">
+              <a:solidFill>
+                <a:schemeClr val="tx1"/>
+              </a:solidFill>
+            </a:endParaRPr>
+          </a:p>
+          <a:p>
+            <a:endParaRPr lang="fr-CH" sz="1400" dirty="0"/>
           </a:p>
         </p:txBody>
       </p:sp>
@@ -3967,7 +4211,7 @@
           <a:lstStyle/>
           <a:p>
             <a:r>
-              <a:rPr lang="fr-CH" sz="1400">
+              <a:rPr lang="fr-CH" sz="1400" dirty="0">
                 <a:solidFill>
                   <a:schemeClr val="tx1"/>
                 </a:solidFill>
@@ -3977,42 +4221,138 @@
           </a:p>
           <a:p>
             <a:r>
-              <a:rPr lang="fr-CH" sz="1400">
-                <a:solidFill>
-                  <a:schemeClr val="tx1"/>
-                </a:solidFill>
-              </a:rPr>
-              <a:t>             rdf:type ldp:Container,</a:t>
-            </a:r>
-          </a:p>
-          <a:p>
-            <a:r>
-              <a:rPr lang="fr-CH" sz="1400">
-                <a:solidFill>
-                  <a:schemeClr val="tx1"/>
-                </a:solidFill>
-              </a:rPr>
-              <a:t>	      type:Piece.</a:t>
-            </a:r>
-          </a:p>
-          <a:p>
-            <a:r>
-              <a:rPr lang="fr-CH" sz="1400">
-                <a:solidFill>
-                  <a:schemeClr val="tx1"/>
-                </a:solidFill>
-              </a:rPr>
-              <a:t>             rico:harOrHadTitle ‘‘Parking Mont-Blanc: diapositive 03 ‘’.</a:t>
-            </a:r>
-          </a:p>
-          <a:p>
-            <a:r>
-              <a:rPr lang="fr-CH" sz="1400">
-                <a:solidFill>
-                  <a:schemeClr val="tx1"/>
-                </a:solidFill>
-              </a:rPr>
-              <a:t>             rico: hasBeginingDate ‘’1986‘’.</a:t>
+              <a:rPr lang="fr-CH" sz="1400" dirty="0">
+                <a:solidFill>
+                  <a:schemeClr val="tx1"/>
+                </a:solidFill>
+              </a:rPr>
+              <a:t>             </a:t>
+            </a:r>
+            <a:r>
+              <a:rPr lang="fr-CH" sz="1400" dirty="0" err="1">
+                <a:solidFill>
+                  <a:schemeClr val="tx1"/>
+                </a:solidFill>
+              </a:rPr>
+              <a:t>rdf:type</a:t>
+            </a:r>
+            <a:r>
+              <a:rPr lang="fr-CH" sz="1400" dirty="0">
+                <a:solidFill>
+                  <a:schemeClr val="tx1"/>
+                </a:solidFill>
+              </a:rPr>
+              <a:t> </a:t>
+            </a:r>
+            <a:r>
+              <a:rPr lang="fr-CH" sz="1400" dirty="0" err="1">
+                <a:solidFill>
+                  <a:schemeClr val="tx1"/>
+                </a:solidFill>
+              </a:rPr>
+              <a:t>ldp:Container</a:t>
+            </a:r>
+            <a:r>
+              <a:rPr lang="fr-CH" sz="1400" dirty="0">
+                <a:solidFill>
+                  <a:schemeClr val="tx1"/>
+                </a:solidFill>
+              </a:rPr>
+              <a:t>,</a:t>
+            </a:r>
+          </a:p>
+          <a:p>
+            <a:r>
+              <a:rPr lang="fr-CH" sz="1400" dirty="0">
+                <a:solidFill>
+                  <a:schemeClr val="tx1"/>
+                </a:solidFill>
+              </a:rPr>
+              <a:t>	      </a:t>
+            </a:r>
+            <a:r>
+              <a:rPr lang="fr-CH" sz="1400" dirty="0" err="1">
+                <a:solidFill>
+                  <a:schemeClr val="tx1"/>
+                </a:solidFill>
+              </a:rPr>
+              <a:t>type:Piece</a:t>
+            </a:r>
+            <a:r>
+              <a:rPr lang="fr-CH" sz="1400" dirty="0">
+                <a:solidFill>
+                  <a:schemeClr val="tx1"/>
+                </a:solidFill>
+              </a:rPr>
+              <a:t>.</a:t>
+            </a:r>
+          </a:p>
+          <a:p>
+            <a:r>
+              <a:rPr lang="fr-CH" sz="1400" dirty="0">
+                <a:solidFill>
+                  <a:schemeClr val="tx1"/>
+                </a:solidFill>
+              </a:rPr>
+              <a:t>             </a:t>
+            </a:r>
+            <a:r>
+              <a:rPr lang="fr-CH" sz="1400" dirty="0" err="1">
+                <a:solidFill>
+                  <a:schemeClr val="tx1"/>
+                </a:solidFill>
+              </a:rPr>
+              <a:t>rico:harOrHadTitle</a:t>
+            </a:r>
+            <a:r>
+              <a:rPr lang="fr-CH" sz="1400" dirty="0">
+                <a:solidFill>
+                  <a:schemeClr val="tx1"/>
+                </a:solidFill>
+              </a:rPr>
+              <a:t> ‘‘Parking Mont-Blanc: diapositive 03 ‘’.</a:t>
+            </a:r>
+          </a:p>
+          <a:p>
+            <a:r>
+              <a:rPr lang="fr-CH" sz="1400" dirty="0">
+                <a:solidFill>
+                  <a:schemeClr val="tx1"/>
+                </a:solidFill>
+              </a:rPr>
+              <a:t>             </a:t>
+            </a:r>
+            <a:r>
+              <a:rPr lang="fr-CH" sz="1400" dirty="0" err="1">
+                <a:solidFill>
+                  <a:schemeClr val="tx1"/>
+                </a:solidFill>
+              </a:rPr>
+              <a:t>rico</a:t>
+            </a:r>
+            <a:r>
+              <a:rPr lang="fr-CH" sz="1400" dirty="0">
+                <a:solidFill>
+                  <a:schemeClr val="tx1"/>
+                </a:solidFill>
+              </a:rPr>
+              <a:t>: </a:t>
+            </a:r>
+            <a:r>
+              <a:rPr lang="fr-CH" sz="1400" dirty="0" err="1">
+                <a:solidFill>
+                  <a:schemeClr val="tx1"/>
+                </a:solidFill>
+              </a:rPr>
+              <a:t>hasBeginingDate</a:t>
+            </a:r>
+            <a:r>
+              <a:rPr lang="fr-CH" sz="1400" dirty="0">
+                <a:solidFill>
+                  <a:schemeClr val="tx1"/>
+                </a:solidFill>
+              </a:rPr>
+              <a:t> ‘’1986‘’.</a:t>
             </a:r>
           </a:p>
         </p:txBody>
@@ -4075,8 +4415,8 @@
         </p:nvSpPr>
         <p:spPr>
           <a:xfrm>
-            <a:off x="4567953" y="5079167"/>
-            <a:ext cx="1077026" cy="307777"/>
+            <a:off x="4567952" y="5079167"/>
+            <a:ext cx="4744723" cy="523220"/>
           </a:xfrm>
           <a:prstGeom prst="rect">
             <a:avLst/>
@@ -4090,9 +4430,24 @@
           <a:lstStyle/>
           <a:p>
             <a:r>
-              <a:rPr lang="fr-CH" sz="1400"/>
+              <a:rPr lang="fr-CH" sz="1400" dirty="0" err="1"/>
               <a:t>ldp:contains</a:t>
             </a:r>
+            <a:r>
+              <a:rPr lang="fr-CH" sz="1400" dirty="0"/>
+              <a:t> </a:t>
+            </a:r>
+            <a:r>
+              <a:rPr lang="fr-CH" sz="1400" dirty="0">
+                <a:solidFill>
+                  <a:schemeClr val="tx1"/>
+                </a:solidFill>
+              </a:rPr>
+              <a:t>at:parking-du-mont-blanc-et-rade-diapositive-3</a:t>
+            </a:r>
+          </a:p>
+          <a:p>
+            <a:endParaRPr lang="fr-CH" sz="1400" dirty="0"/>
           </a:p>
         </p:txBody>
       </p:sp>
@@ -4224,52 +4579,137 @@
           <a:lstStyle/>
           <a:p>
             <a:r>
-              <a:rPr lang="fr-CH" sz="1400">
+              <a:rPr lang="fr-CH" sz="1400" dirty="0" err="1">
                 <a:solidFill>
                   <a:schemeClr val="tx1"/>
                 </a:solidFill>
               </a:rPr>
               <a:t>at:zschokke-constructions</a:t>
             </a:r>
-          </a:p>
-          <a:p>
-            <a:r>
-              <a:rPr lang="fr-CH" sz="1400">
-                <a:solidFill>
-                  <a:schemeClr val="tx1"/>
-                </a:solidFill>
-              </a:rPr>
-              <a:t>             rdf:type [ ldp:Container;</a:t>
-            </a:r>
-          </a:p>
-          <a:p>
-            <a:r>
-              <a:rPr lang="fr-CH" sz="1400">
-                <a:solidFill>
-                  <a:schemeClr val="tx1"/>
-                </a:solidFill>
-              </a:rPr>
-              <a:t>	        type:Fonds ] ;</a:t>
-            </a:r>
-          </a:p>
-          <a:p>
-            <a:r>
-              <a:rPr lang="fr-CH" sz="1400">
-                <a:solidFill>
-                  <a:schemeClr val="tx1"/>
-                </a:solidFill>
-              </a:rPr>
-              <a:t>            rico:harOrHadTitle ‘ZSCHOKKE Constructions ‘’;</a:t>
-            </a:r>
-          </a:p>
-          <a:p>
-            <a:r>
-              <a:rPr lang="fr-CH" sz="1400">
-                <a:solidFill>
-                  <a:schemeClr val="tx1"/>
-                </a:solidFill>
-              </a:rPr>
-              <a:t>            rico:hasBeginingDate ‘’1967‘’.</a:t>
+            <a:endParaRPr lang="fr-CH" sz="1400" dirty="0">
+              <a:solidFill>
+                <a:schemeClr val="tx1"/>
+              </a:solidFill>
+            </a:endParaRPr>
+          </a:p>
+          <a:p>
+            <a:r>
+              <a:rPr lang="fr-CH" sz="1400" dirty="0">
+                <a:solidFill>
+                  <a:schemeClr val="tx1"/>
+                </a:solidFill>
+              </a:rPr>
+              <a:t>             </a:t>
+            </a:r>
+            <a:r>
+              <a:rPr lang="fr-CH" sz="1400" dirty="0" err="1">
+                <a:solidFill>
+                  <a:schemeClr val="tx1"/>
+                </a:solidFill>
+              </a:rPr>
+              <a:t>rdf:type</a:t>
+            </a:r>
+            <a:r>
+              <a:rPr lang="fr-CH" sz="1400" dirty="0">
+                <a:solidFill>
+                  <a:schemeClr val="tx1"/>
+                </a:solidFill>
+              </a:rPr>
+              <a:t> [ </a:t>
+            </a:r>
+            <a:r>
+              <a:rPr lang="fr-CH" sz="1400" dirty="0" err="1">
+                <a:solidFill>
+                  <a:schemeClr val="tx1"/>
+                </a:solidFill>
+              </a:rPr>
+              <a:t>ldp:Container</a:t>
+            </a:r>
+            <a:r>
+              <a:rPr lang="fr-CH" sz="1400" dirty="0">
+                <a:solidFill>
+                  <a:schemeClr val="tx1"/>
+                </a:solidFill>
+              </a:rPr>
+              <a:t> ,</a:t>
+            </a:r>
+          </a:p>
+          <a:p>
+            <a:r>
+              <a:rPr lang="fr-CH" sz="1400" dirty="0">
+                <a:solidFill>
+                  <a:schemeClr val="tx1"/>
+                </a:solidFill>
+              </a:rPr>
+              <a:t>	        </a:t>
+            </a:r>
+            <a:r>
+              <a:rPr lang="fr-CH" sz="1400" dirty="0" err="1">
+                <a:solidFill>
+                  <a:schemeClr val="tx1"/>
+                </a:solidFill>
+              </a:rPr>
+              <a:t>type:Fonds</a:t>
+            </a:r>
+            <a:r>
+              <a:rPr lang="fr-CH" sz="1400" dirty="0">
+                <a:solidFill>
+                  <a:schemeClr val="tx1"/>
+                </a:solidFill>
+              </a:rPr>
+              <a:t> ] ;</a:t>
+            </a:r>
+          </a:p>
+          <a:p>
+            <a:r>
+              <a:rPr lang="fr-CH" sz="1400" dirty="0">
+                <a:solidFill>
+                  <a:schemeClr val="tx1"/>
+                </a:solidFill>
+              </a:rPr>
+              <a:t>            </a:t>
+            </a:r>
+            <a:r>
+              <a:rPr lang="fr-CH" sz="1400" dirty="0" err="1">
+                <a:solidFill>
+                  <a:schemeClr val="tx1"/>
+                </a:solidFill>
+              </a:rPr>
+              <a:t>rico:harOrHadTitle</a:t>
+            </a:r>
+            <a:r>
+              <a:rPr lang="fr-CH" sz="1400" dirty="0">
+                <a:solidFill>
+                  <a:schemeClr val="tx1"/>
+                </a:solidFill>
+              </a:rPr>
+              <a:t> ‘ZSCHOKKE Constructions ‘’;</a:t>
+            </a:r>
+          </a:p>
+          <a:p>
+            <a:r>
+              <a:rPr lang="fr-CH" sz="1400" dirty="0">
+                <a:solidFill>
+                  <a:schemeClr val="tx1"/>
+                </a:solidFill>
+              </a:rPr>
+              <a:t>            </a:t>
+            </a:r>
+            <a:r>
+              <a:rPr lang="fr-CH" sz="1400" dirty="0" err="1">
+                <a:solidFill>
+                  <a:schemeClr val="tx1"/>
+                </a:solidFill>
+              </a:rPr>
+              <a:t>rico:hasBeginingDate</a:t>
+            </a:r>
+            <a:r>
+              <a:rPr lang="fr-CH" sz="1400" dirty="0">
+                <a:solidFill>
+                  <a:schemeClr val="tx1"/>
+                </a:solidFill>
+              </a:rPr>
+              <a:t> ‘’1967‘’.</a:t>
             </a:r>
           </a:p>
         </p:txBody>
@@ -4333,7 +4773,7 @@
         <p:spPr>
           <a:xfrm>
             <a:off x="2421909" y="1881568"/>
-            <a:ext cx="1077026" cy="307777"/>
+            <a:ext cx="1924629" cy="523220"/>
           </a:xfrm>
           <a:prstGeom prst="rect">
             <a:avLst/>
@@ -4347,9 +4787,29 @@
           <a:lstStyle/>
           <a:p>
             <a:r>
-              <a:rPr lang="fr-CH" sz="1400"/>
+              <a:rPr lang="fr-CH" sz="1400" dirty="0" err="1"/>
               <a:t>ldp:contains</a:t>
             </a:r>
+            <a:r>
+              <a:rPr lang="fr-CH" sz="1400" dirty="0"/>
+              <a:t> </a:t>
+            </a:r>
+            <a:r>
+              <a:rPr lang="fr-CH" sz="1400" dirty="0" err="1">
+                <a:solidFill>
+                  <a:schemeClr val="tx1"/>
+                </a:solidFill>
+              </a:rPr>
+              <a:t>at:zscc-img</a:t>
+            </a:r>
+            <a:endParaRPr lang="fr-CH" sz="1400" dirty="0">
+              <a:solidFill>
+                <a:schemeClr val="tx1"/>
+              </a:solidFill>
+            </a:endParaRPr>
+          </a:p>
+          <a:p>
+            <a:endParaRPr lang="fr-CH" sz="1400" dirty="0"/>
           </a:p>
         </p:txBody>
       </p:sp>

</xml_diff>